<commit_message>
updated precision and recall
</commit_message>
<xml_diff>
--- a/Presentation/18Jan2018.pptx
+++ b/Presentation/18Jan2018.pptx
@@ -18,7 +18,6 @@
     <p:sldId id="261" r:id="rId11"/>
     <p:sldId id="262" r:id="rId12"/>
     <p:sldId id="263" r:id="rId13"/>
-    <p:sldId id="264" r:id="rId14"/>
   </p:sldIdLst>
   <p:sldSz cx="9144000" cy="5143500"/>
   <p:notesSz cx="6858000" cy="9144000"/>
@@ -126,7 +125,7 @@
                 </a:uFill>
                 <a:latin typeface="Times New Roman"/>
               </a:rPr>
-              <a:t> </a:t>
+              <a:t>&lt;header&gt;</a:t>
             </a:r>
             <a:endParaRPr b="0" lang="en-US" sz="1400" spc="-1" strike="noStrike">
               <a:solidFill>
@@ -177,7 +176,7 @@
                 </a:uFill>
                 <a:latin typeface="Times New Roman"/>
               </a:rPr>
-              <a:t> </a:t>
+              <a:t>&lt;date/time&gt;</a:t>
             </a:r>
             <a:endParaRPr b="0" lang="en-US" sz="1400" spc="-1" strike="noStrike">
               <a:solidFill>
@@ -227,7 +226,7 @@
                 </a:uFill>
                 <a:latin typeface="Times New Roman"/>
               </a:rPr>
-              <a:t> </a:t>
+              <a:t>&lt;footer&gt;</a:t>
             </a:r>
             <a:endParaRPr b="0" lang="en-US" sz="1400" spc="-1" strike="noStrike">
               <a:solidFill>
@@ -266,7 +265,7 @@
           <a:bodyPr lIns="0" rIns="0" tIns="0" bIns="0" anchor="b"/>
           <a:p>
             <a:pPr algn="r"/>
-            <a:fld id="{EC692E3A-6B8D-419E-A987-EBA5774768A0}" type="slidenum">
+            <a:fld id="{1F1D0116-5B8F-46E8-A1D8-59FE5EDD6330}" type="slidenum">
               <a:rPr b="0" lang="en-US" sz="1400" spc="-1" strike="noStrike">
                 <a:solidFill>
                   <a:srgbClr val="000000"/>
@@ -278,7 +277,7 @@
                 </a:uFill>
                 <a:latin typeface="Times New Roman"/>
               </a:rPr>
-              <a:t>1</a:t>
+              <a:t>&lt;number&gt;</a:t>
             </a:fld>
             <a:endParaRPr b="0" lang="en-US" sz="1400" spc="-1" strike="noStrike">
               <a:solidFill>
@@ -319,7 +318,7 @@
       </p:grpSpPr>
       <p:sp>
         <p:nvSpPr>
-          <p:cNvPr id="148" name="PlaceHolder 1"/>
+          <p:cNvPr id="145" name="PlaceHolder 1"/>
           <p:cNvSpPr>
             <a:spLocks noGrp="1"/>
           </p:cNvSpPr>
@@ -330,7 +329,7 @@
         <p:spPr>
           <a:xfrm>
             <a:off x="685800" y="4343400"/>
-            <a:ext cx="5484600" cy="4113000"/>
+            <a:ext cx="5484240" cy="4112640"/>
           </a:xfrm>
           <a:prstGeom prst="rect">
             <a:avLst/>
@@ -355,14 +354,14 @@
       </p:sp>
       <p:sp>
         <p:nvSpPr>
-          <p:cNvPr id="149" name="CustomShape 2"/>
+          <p:cNvPr id="146" name="CustomShape 2"/>
           <p:cNvSpPr/>
           <p:nvPr/>
         </p:nvSpPr>
         <p:spPr>
           <a:xfrm>
             <a:off x="3884760" y="8685360"/>
-            <a:ext cx="2970000" cy="455400"/>
+            <a:ext cx="2969640" cy="455040"/>
           </a:xfrm>
           <a:prstGeom prst="rect">
             <a:avLst/>
@@ -386,7 +385,7 @@
                 <a:spcPct val="100000"/>
               </a:lnSpc>
             </a:pPr>
-            <a:fld id="{695F3210-3E52-485C-95A8-70AE25E6943A}" type="slidenum">
+            <a:fld id="{63E97A4C-4B67-4188-A36F-E9FDEAAEBDA9}" type="slidenum">
               <a:rPr b="0" lang="en-US" sz="1200" spc="-1" strike="noStrike">
                 <a:solidFill>
                   <a:srgbClr val="000000"/>
@@ -4875,7 +4874,7 @@
         <p:spPr>
           <a:xfrm>
             <a:off x="76320" y="150840"/>
-            <a:ext cx="182880" cy="367560"/>
+            <a:ext cx="182520" cy="367200"/>
           </a:xfrm>
           <a:prstGeom prst="rect">
             <a:avLst/>
@@ -4905,7 +4904,7 @@
         <p:spPr>
           <a:xfrm>
             <a:off x="0" y="0"/>
-            <a:ext cx="9142200" cy="5118480"/>
+            <a:ext cx="9141840" cy="5118120"/>
           </a:xfrm>
           <a:prstGeom prst="rect">
             <a:avLst/>
@@ -5287,7 +5286,7 @@
         <p:spPr>
           <a:xfrm>
             <a:off x="76320" y="150840"/>
-            <a:ext cx="182880" cy="367560"/>
+            <a:ext cx="182520" cy="367200"/>
           </a:xfrm>
           <a:prstGeom prst="rect">
             <a:avLst/>
@@ -5313,7 +5312,7 @@
         <p:spPr>
           <a:xfrm>
             <a:off x="5946120" y="0"/>
-            <a:ext cx="3196080" cy="543240"/>
+            <a:ext cx="3195720" cy="542880"/>
           </a:xfrm>
           <a:prstGeom prst="rect">
             <a:avLst/>
@@ -5352,7 +5351,7 @@
         <p:spPr>
           <a:xfrm>
             <a:off x="7401600" y="172080"/>
-            <a:ext cx="1482840" cy="186120"/>
+            <a:ext cx="1482480" cy="185760"/>
           </a:xfrm>
           <a:prstGeom prst="rect">
             <a:avLst/>
@@ -5371,7 +5370,7 @@
         <p:spPr>
           <a:xfrm>
             <a:off x="0" y="5016600"/>
-            <a:ext cx="9142200" cy="125280"/>
+            <a:ext cx="9141840" cy="124920"/>
           </a:xfrm>
           <a:prstGeom prst="rect">
             <a:avLst/>
@@ -5399,7 +5398,7 @@
         <p:spPr>
           <a:xfrm>
             <a:off x="0" y="4952880"/>
-            <a:ext cx="9142200" cy="61560"/>
+            <a:ext cx="9141840" cy="61200"/>
           </a:xfrm>
           <a:prstGeom prst="rect">
             <a:avLst/>
@@ -5790,7 +5789,7 @@
         <p:spPr>
           <a:xfrm>
             <a:off x="76320" y="150840"/>
-            <a:ext cx="182880" cy="367560"/>
+            <a:ext cx="182520" cy="367200"/>
           </a:xfrm>
           <a:prstGeom prst="rect">
             <a:avLst/>
@@ -6172,7 +6171,7 @@
         <p:spPr>
           <a:xfrm>
             <a:off x="3660480" y="-23760"/>
-            <a:ext cx="5481720" cy="3554640"/>
+            <a:ext cx="5481360" cy="3554280"/>
           </a:xfrm>
           <a:prstGeom prst="rect">
             <a:avLst/>
@@ -6206,7 +6205,7 @@
         <p:spPr>
           <a:xfrm>
             <a:off x="6845400" y="205200"/>
-            <a:ext cx="2109960" cy="420480"/>
+            <a:ext cx="2109600" cy="420120"/>
           </a:xfrm>
           <a:prstGeom prst="rect">
             <a:avLst/>
@@ -6225,7 +6224,7 @@
         <p:spPr>
           <a:xfrm>
             <a:off x="3981960" y="2163960"/>
-            <a:ext cx="4197600" cy="659880"/>
+            <a:ext cx="4197240" cy="659520"/>
           </a:xfrm>
           <a:prstGeom prst="rect">
             <a:avLst/>
@@ -6320,7 +6319,7 @@
         <p:spPr>
           <a:xfrm>
             <a:off x="3981960" y="1107360"/>
-            <a:ext cx="4912920" cy="429120"/>
+            <a:ext cx="4912560" cy="428760"/>
           </a:xfrm>
           <a:prstGeom prst="rect">
             <a:avLst/>
@@ -6397,7 +6396,7 @@
         <p:spPr>
           <a:xfrm>
             <a:off x="4970880" y="3037680"/>
-            <a:ext cx="3923640" cy="344160"/>
+            <a:ext cx="3923280" cy="343800"/>
           </a:xfrm>
           <a:prstGeom prst="rect">
             <a:avLst/>
@@ -6541,7 +6540,7 @@
         <p:spPr>
           <a:xfrm>
             <a:off x="443160" y="326880"/>
-            <a:ext cx="7315200" cy="855720"/>
+            <a:ext cx="7314840" cy="855360"/>
           </a:xfrm>
           <a:prstGeom prst="rect">
             <a:avLst/>
@@ -6603,7 +6602,7 @@
         <p:spPr>
           <a:xfrm>
             <a:off x="386640" y="1303920"/>
-            <a:ext cx="7984080" cy="3286440"/>
+            <a:ext cx="7983720" cy="3286080"/>
           </a:xfrm>
           <a:prstGeom prst="rect">
             <a:avLst/>
@@ -6681,7 +6680,7 @@
         <p:spPr>
           <a:xfrm>
             <a:off x="443160" y="326880"/>
-            <a:ext cx="7315200" cy="855360"/>
+            <a:ext cx="7314840" cy="855000"/>
           </a:xfrm>
           <a:prstGeom prst="rect">
             <a:avLst/>
@@ -6743,7 +6742,7 @@
         <p:spPr>
           <a:xfrm>
             <a:off x="386640" y="1303920"/>
-            <a:ext cx="7984080" cy="3286440"/>
+            <a:ext cx="7983720" cy="3286080"/>
           </a:xfrm>
           <a:prstGeom prst="rect">
             <a:avLst/>
@@ -6762,7 +6761,7 @@
         <p:txBody>
           <a:bodyPr lIns="90000" rIns="90000" tIns="91440" bIns="91440"/>
           <a:p>
-            <a:pPr marL="228600" indent="-99720">
+            <a:pPr marL="228600" indent="-99360">
               <a:lnSpc>
                 <a:spcPct val="100000"/>
               </a:lnSpc>
@@ -6800,7 +6799,7 @@
             </a:endParaRPr>
           </a:p>
           <a:p>
-            <a:pPr marL="228600" indent="-99720">
+            <a:pPr marL="228600" indent="-99360">
               <a:lnSpc>
                 <a:spcPct val="100000"/>
               </a:lnSpc>
@@ -6838,7 +6837,7 @@
             </a:endParaRPr>
           </a:p>
           <a:p>
-            <a:pPr marL="228600" indent="-99720">
+            <a:pPr marL="228600" indent="-99360">
               <a:lnSpc>
                 <a:spcPct val="100000"/>
               </a:lnSpc>
@@ -6876,7 +6875,7 @@
             </a:endParaRPr>
           </a:p>
           <a:p>
-            <a:pPr marL="228600" indent="-99720">
+            <a:pPr marL="228600" indent="-99360">
               <a:lnSpc>
                 <a:spcPct val="100000"/>
               </a:lnSpc>
@@ -6914,7 +6913,7 @@
             </a:endParaRPr>
           </a:p>
           <a:p>
-            <a:pPr marL="228600" indent="-99720">
+            <a:pPr marL="228600" indent="-99360">
               <a:lnSpc>
                 <a:spcPct val="100000"/>
               </a:lnSpc>
@@ -6962,7 +6961,7 @@
         <p:spPr>
           <a:xfrm>
             <a:off x="6774120" y="4688280"/>
-            <a:ext cx="2131920" cy="272880"/>
+            <a:ext cx="2131560" cy="272520"/>
           </a:xfrm>
           <a:prstGeom prst="rect">
             <a:avLst/>
@@ -6986,7 +6985,7 @@
                 <a:spcPct val="100000"/>
               </a:lnSpc>
             </a:pPr>
-            <a:fld id="{28F46958-B351-4AF2-B6D5-C0139EF5AF52}" type="slidenum">
+            <a:fld id="{C2CE6168-4A27-4670-9D00-04D9D5A9D366}" type="slidenum">
               <a:rPr b="0" lang="en-US" sz="1200" spc="-1" strike="noStrike">
                 <a:solidFill>
                   <a:srgbClr val="888888"/>
@@ -6999,7 +6998,7 @@
                 <a:latin typeface="Arial"/>
                 <a:ea typeface="Arial"/>
               </a:rPr>
-              <a:t>1</a:t>
+              <a:t>&lt;number&gt;</a:t>
             </a:fld>
             <a:endParaRPr b="0" lang="en-US" sz="1800" spc="-1" strike="noStrike">
               <a:solidFill>
@@ -7076,7 +7075,7 @@
         <p:spPr>
           <a:xfrm>
             <a:off x="443160" y="326880"/>
-            <a:ext cx="7315200" cy="855360"/>
+            <a:ext cx="7314840" cy="855000"/>
           </a:xfrm>
           <a:prstGeom prst="rect">
             <a:avLst/>
@@ -7153,7 +7152,7 @@
         <p:spPr>
           <a:xfrm>
             <a:off x="386640" y="1303920"/>
-            <a:ext cx="7984080" cy="3286440"/>
+            <a:ext cx="7983720" cy="3286080"/>
           </a:xfrm>
           <a:prstGeom prst="rect">
             <a:avLst/>
@@ -7172,7 +7171,7 @@
         <p:txBody>
           <a:bodyPr lIns="90000" rIns="90000" tIns="91440" bIns="91440"/>
           <a:p>
-            <a:pPr marL="228600" indent="-99720">
+            <a:pPr marL="228600" indent="-99360">
               <a:lnSpc>
                 <a:spcPct val="100000"/>
               </a:lnSpc>
@@ -7210,7 +7209,7 @@
             </a:endParaRPr>
           </a:p>
           <a:p>
-            <a:pPr lvl="1" marL="432000" indent="-216000">
+            <a:pPr lvl="1" marL="432000" indent="-215640">
               <a:lnSpc>
                 <a:spcPct val="100000"/>
               </a:lnSpc>
@@ -7249,7 +7248,7 @@
             </a:endParaRPr>
           </a:p>
           <a:p>
-            <a:pPr lvl="2" marL="648000" indent="-216000">
+            <a:pPr lvl="2" marL="648000" indent="-215640">
               <a:lnSpc>
                 <a:spcPct val="100000"/>
               </a:lnSpc>
@@ -7288,7 +7287,7 @@
             </a:endParaRPr>
           </a:p>
           <a:p>
-            <a:pPr lvl="2" marL="648000" indent="-216000">
+            <a:pPr lvl="2" marL="648000" indent="-215640">
               <a:lnSpc>
                 <a:spcPct val="100000"/>
               </a:lnSpc>
@@ -7327,7 +7326,7 @@
             </a:endParaRPr>
           </a:p>
           <a:p>
-            <a:pPr lvl="1" marL="432000" indent="-216000">
+            <a:pPr lvl="1" marL="432000" indent="-215640">
               <a:lnSpc>
                 <a:spcPct val="100000"/>
               </a:lnSpc>
@@ -7366,7 +7365,7 @@
             </a:endParaRPr>
           </a:p>
           <a:p>
-            <a:pPr lvl="2" marL="648000" indent="-216000">
+            <a:pPr lvl="2" marL="648000" indent="-215640">
               <a:lnSpc>
                 <a:spcPct val="100000"/>
               </a:lnSpc>
@@ -7405,7 +7404,7 @@
             </a:endParaRPr>
           </a:p>
           <a:p>
-            <a:pPr lvl="2" marL="648000" indent="-216000">
+            <a:pPr lvl="2" marL="648000" indent="-215640">
               <a:lnSpc>
                 <a:spcPct val="100000"/>
               </a:lnSpc>
@@ -7444,7 +7443,7 @@
             </a:endParaRPr>
           </a:p>
           <a:p>
-            <a:pPr lvl="2" marL="648000" indent="-216000">
+            <a:pPr lvl="2" marL="648000" indent="-215640">
               <a:lnSpc>
                 <a:spcPct val="100000"/>
               </a:lnSpc>
@@ -7483,7 +7482,46 @@
             </a:endParaRPr>
           </a:p>
           <a:p>
-            <a:pPr marL="228600" indent="-99720">
+            <a:pPr lvl="2" marL="648000" indent="-215640">
+              <a:lnSpc>
+                <a:spcPct val="100000"/>
+              </a:lnSpc>
+              <a:buClr>
+                <a:srgbClr val="000000"/>
+              </a:buClr>
+              <a:buSzPct val="45000"/>
+              <a:buFont typeface="Wingdings" charset="2"/>
+              <a:buChar char=""/>
+            </a:pPr>
+            <a:r>
+              <a:rPr b="0" lang="en-US" sz="2000" spc="-1" strike="noStrike">
+                <a:solidFill>
+                  <a:srgbClr val="000000"/>
+                </a:solidFill>
+                <a:uFill>
+                  <a:solidFill>
+                    <a:srgbClr val="ffffff"/>
+                  </a:solidFill>
+                </a:uFill>
+                <a:latin typeface="Arial"/>
+                <a:ea typeface="Arial"/>
+              </a:rPr>
+              <a:t>Summary: Algorithm Errors ? Database Errors: </a:t>
+            </a:r>
+            <a:endParaRPr b="0" lang="en-US" sz="1800" spc="-1" strike="noStrike">
+              <a:solidFill>
+                <a:srgbClr val="000000"/>
+              </a:solidFill>
+              <a:uFill>
+                <a:solidFill>
+                  <a:srgbClr val="ffffff"/>
+                </a:solidFill>
+              </a:uFill>
+              <a:latin typeface="Arial"/>
+            </a:endParaRPr>
+          </a:p>
+          <a:p>
+            <a:pPr marL="228600" indent="-99360">
               <a:lnSpc>
                 <a:spcPct val="100000"/>
               </a:lnSpc>
@@ -7504,14 +7542,61 @@
                   </a:solidFill>
                 </a:uFill>
                 <a:latin typeface="Arial"/>
-                <a:ea typeface="Arial"/>
+                <a:ea typeface="DejaVu Sans"/>
               </a:rPr>
-              <a:t>Summary: Algorithm Errors ? Database Errors: </a:t>
+              <a:t> </a:t>
             </a:r>
-            <a:r>
-              <a:rPr b="0" lang="en-US" sz="2000" spc="-1" strike="noStrike">
-                <a:solidFill>
-                  <a:srgbClr val="000000"/>
+            <a:endParaRPr b="0" lang="en-US" sz="1800" spc="-1" strike="noStrike">
+              <a:solidFill>
+                <a:srgbClr val="000000"/>
+              </a:solidFill>
+              <a:uFill>
+                <a:solidFill>
+                  <a:srgbClr val="ffffff"/>
+                </a:solidFill>
+              </a:uFill>
+              <a:latin typeface="Arial"/>
+            </a:endParaRPr>
+          </a:p>
+        </p:txBody>
+      </p:sp>
+      <p:sp>
+        <p:nvSpPr>
+          <p:cNvPr id="133" name="CustomShape 3"/>
+          <p:cNvSpPr/>
+          <p:nvPr/>
+        </p:nvSpPr>
+        <p:spPr>
+          <a:xfrm>
+            <a:off x="6774120" y="4688280"/>
+            <a:ext cx="2131560" cy="272520"/>
+          </a:xfrm>
+          <a:prstGeom prst="rect">
+            <a:avLst/>
+          </a:prstGeom>
+          <a:noFill/>
+          <a:ln>
+            <a:noFill/>
+          </a:ln>
+        </p:spPr>
+        <p:style>
+          <a:lnRef idx="0"/>
+          <a:fillRef idx="0"/>
+          <a:effectRef idx="0"/>
+          <a:fontRef idx="minor"/>
+        </p:style>
+        <p:txBody>
+          <a:bodyPr lIns="90000" rIns="90000" tIns="45000" bIns="45000" anchor="ctr"/>
+          <a:p>
+            <a:pPr algn="r">
+              <a:lnSpc>
+                <a:spcPct val="100000"/>
+              </a:lnSpc>
+            </a:pPr>
+            <a:fld id="{9D564EE1-465C-4731-BA30-72CDC8CDA932}" type="slidenum">
+              <a:rPr b="0" lang="en-US" sz="1200" spc="-1" strike="noStrike">
+                <a:solidFill>
+                  <a:srgbClr val="888888"/>
                 </a:solidFill>
                 <a:uFill>
                   <a:solidFill>
@@ -7521,84 +7606,7 @@
                 <a:latin typeface="Arial"/>
                 <a:ea typeface="Arial"/>
               </a:rPr>
-              <a:t>
-</a:t>
-            </a:r>
-            <a:r>
-              <a:rPr b="0" lang="en-US" sz="2000" spc="-1" strike="noStrike">
-                <a:solidFill>
-                  <a:srgbClr val="000000"/>
-                </a:solidFill>
-                <a:uFill>
-                  <a:solidFill>
-                    <a:srgbClr val="ffffff"/>
-                  </a:solidFill>
-                </a:uFill>
-                <a:latin typeface="Arial"/>
-              </a:rPr>
-              <a:t> </a:t>
-            </a:r>
-            <a:endParaRPr b="0" lang="en-US" sz="1800" spc="-1" strike="noStrike">
-              <a:solidFill>
-                <a:srgbClr val="000000"/>
-              </a:solidFill>
-              <a:uFill>
-                <a:solidFill>
-                  <a:srgbClr val="ffffff"/>
-                </a:solidFill>
-              </a:uFill>
-              <a:latin typeface="Arial"/>
-            </a:endParaRPr>
-          </a:p>
-        </p:txBody>
-      </p:sp>
-      <p:sp>
-        <p:nvSpPr>
-          <p:cNvPr id="133" name="CustomShape 3"/>
-          <p:cNvSpPr/>
-          <p:nvPr/>
-        </p:nvSpPr>
-        <p:spPr>
-          <a:xfrm>
-            <a:off x="6774120" y="4688280"/>
-            <a:ext cx="2131920" cy="272880"/>
-          </a:xfrm>
-          <a:prstGeom prst="rect">
-            <a:avLst/>
-          </a:prstGeom>
-          <a:noFill/>
-          <a:ln>
-            <a:noFill/>
-          </a:ln>
-        </p:spPr>
-        <p:style>
-          <a:lnRef idx="0"/>
-          <a:fillRef idx="0"/>
-          <a:effectRef idx="0"/>
-          <a:fontRef idx="minor"/>
-        </p:style>
-        <p:txBody>
-          <a:bodyPr lIns="90000" rIns="90000" tIns="45000" bIns="45000" anchor="ctr"/>
-          <a:p>
-            <a:pPr algn="r">
-              <a:lnSpc>
-                <a:spcPct val="100000"/>
-              </a:lnSpc>
-            </a:pPr>
-            <a:fld id="{06C58E8D-50CF-4729-847D-847F9D5CCFFE}" type="slidenum">
-              <a:rPr b="0" lang="en-US" sz="1200" spc="-1" strike="noStrike">
-                <a:solidFill>
-                  <a:srgbClr val="888888"/>
-                </a:solidFill>
-                <a:uFill>
-                  <a:solidFill>
-                    <a:srgbClr val="ffffff"/>
-                  </a:solidFill>
-                </a:uFill>
-                <a:latin typeface="Arial"/>
-                <a:ea typeface="Arial"/>
-              </a:rPr>
-              <a:t>1</a:t>
+              <a:t>&lt;number&gt;</a:t>
             </a:fld>
             <a:endParaRPr b="0" lang="en-US" sz="1800" spc="-1" strike="noStrike">
               <a:solidFill>
@@ -7675,7 +7683,7 @@
         <p:spPr>
           <a:xfrm>
             <a:off x="443160" y="326880"/>
-            <a:ext cx="7315200" cy="855360"/>
+            <a:ext cx="7314840" cy="855000"/>
           </a:xfrm>
           <a:prstGeom prst="rect">
             <a:avLst/>
@@ -7752,7 +7760,7 @@
         <p:spPr>
           <a:xfrm>
             <a:off x="386640" y="1303920"/>
-            <a:ext cx="7984080" cy="3286440"/>
+            <a:ext cx="7983720" cy="3286080"/>
           </a:xfrm>
           <a:prstGeom prst="rect">
             <a:avLst/>
@@ -7771,7 +7779,7 @@
         <p:txBody>
           <a:bodyPr lIns="90000" rIns="90000" tIns="91440" bIns="91440"/>
           <a:p>
-            <a:pPr marL="228600" indent="-99720">
+            <a:pPr marL="228600" indent="-99360">
               <a:lnSpc>
                 <a:spcPct val="100000"/>
               </a:lnSpc>
@@ -7809,7 +7817,7 @@
             </a:endParaRPr>
           </a:p>
           <a:p>
-            <a:pPr lvl="1" marL="432000" indent="-216000">
+            <a:pPr lvl="1" marL="432000" indent="-215640">
               <a:lnSpc>
                 <a:spcPct val="100000"/>
               </a:lnSpc>
@@ -7848,7 +7856,7 @@
             </a:endParaRPr>
           </a:p>
           <a:p>
-            <a:pPr lvl="2" marL="648000" indent="-216000">
+            <a:pPr lvl="2" marL="648000" indent="-215640">
               <a:lnSpc>
                 <a:spcPct val="100000"/>
               </a:lnSpc>
@@ -7887,7 +7895,7 @@
             </a:endParaRPr>
           </a:p>
           <a:p>
-            <a:pPr lvl="1" marL="432000" indent="-216000">
+            <a:pPr lvl="1" marL="432000" indent="-215640">
               <a:lnSpc>
                 <a:spcPct val="100000"/>
               </a:lnSpc>
@@ -7926,7 +7934,7 @@
             </a:endParaRPr>
           </a:p>
           <a:p>
-            <a:pPr lvl="2" marL="648000" indent="-216000">
+            <a:pPr lvl="2" marL="648000" indent="-215640">
               <a:lnSpc>
                 <a:spcPct val="100000"/>
               </a:lnSpc>
@@ -7950,22 +7958,7 @@
                 <a:latin typeface="Arial"/>
                 <a:ea typeface="Arial"/>
               </a:rPr>
-              <a:t>Didn’t find → “Butter Bread and Jelly”. </a:t>
-            </a:r>
-            <a:r>
-              <a:rPr b="0" lang="en-US" sz="2000" spc="-1" strike="noStrike">
-                <a:solidFill>
-                  <a:srgbClr val="000000"/>
-                </a:solidFill>
-                <a:uFill>
-                  <a:solidFill>
-                    <a:srgbClr val="ffffff"/>
-                  </a:solidFill>
-                </a:uFill>
-                <a:latin typeface="Arial"/>
-                <a:ea typeface="Arial"/>
-              </a:rPr>
-              <a:t>Found → “Butter”, ”Bread”, “Jelly”. </a:t>
+              <a:t>Didn’t find → “Butter Bread and Jelly”. Found → “Butter”, ”Bread”, “Jelly”. </a:t>
             </a:r>
             <a:endParaRPr b="0" lang="en-US" sz="1800" spc="-1" strike="noStrike">
               <a:solidFill>
@@ -7980,7 +7973,7 @@
             </a:endParaRPr>
           </a:p>
           <a:p>
-            <a:pPr lvl="2" marL="648000" indent="-216000">
+            <a:pPr lvl="2" marL="648000" indent="-215640">
               <a:lnSpc>
                 <a:spcPct val="100000"/>
               </a:lnSpc>
@@ -8019,7 +8012,7 @@
             </a:endParaRPr>
           </a:p>
           <a:p>
-            <a:pPr lvl="2" marL="648000" indent="-216000">
+            <a:pPr lvl="2" marL="648000" indent="-215640">
               <a:lnSpc>
                 <a:spcPct val="100000"/>
               </a:lnSpc>
@@ -8043,8 +8036,32 @@
                 <a:latin typeface="Arial"/>
                 <a:ea typeface="Arial"/>
               </a:rPr>
-              <a:t>Didn't Find → “Macaroni Salad”. </a:t>
+              <a:t>Didn't Find → “Macaroni Salad”. Found → “Macaroni”, “Salad”. </a:t>
             </a:r>
+            <a:endParaRPr b="0" lang="en-US" sz="1800" spc="-1" strike="noStrike">
+              <a:solidFill>
+                <a:srgbClr val="000000"/>
+              </a:solidFill>
+              <a:uFill>
+                <a:solidFill>
+                  <a:srgbClr val="ffffff"/>
+                </a:solidFill>
+              </a:uFill>
+              <a:latin typeface="Arial"/>
+            </a:endParaRPr>
+          </a:p>
+          <a:p>
+            <a:pPr lvl="2" marL="648000" indent="-215640">
+              <a:lnSpc>
+                <a:spcPct val="100000"/>
+              </a:lnSpc>
+              <a:buClr>
+                <a:srgbClr val="000000"/>
+              </a:buClr>
+              <a:buSzPct val="45000"/>
+              <a:buFont typeface="Wingdings" charset="2"/>
+              <a:buChar char=""/>
+            </a:pPr>
             <a:r>
               <a:rPr b="0" lang="en-US" sz="2000" spc="-1" strike="noStrike">
                 <a:solidFill>
@@ -8058,7 +8075,7 @@
                 <a:latin typeface="Arial"/>
                 <a:ea typeface="Arial"/>
               </a:rPr>
-              <a:t>Found → “Macaroni”, “Salad”. </a:t>
+              <a:t>Didn’t find → “Milk Shake”. (Found → “Milk”, “Shake”)</a:t>
             </a:r>
             <a:endParaRPr b="0" lang="en-US" sz="1800" spc="-1" strike="noStrike">
               <a:solidFill>
@@ -8073,7 +8090,7 @@
             </a:endParaRPr>
           </a:p>
           <a:p>
-            <a:pPr lvl="2" marL="648000" indent="-216000">
+            <a:pPr lvl="2" marL="648000" indent="-215640">
               <a:lnSpc>
                 <a:spcPct val="100000"/>
               </a:lnSpc>
@@ -8097,22 +8114,7 @@
                 <a:latin typeface="Arial"/>
                 <a:ea typeface="Arial"/>
               </a:rPr>
-              <a:t>Didn’t find → “Milk Shake”. (</a:t>
-            </a:r>
-            <a:r>
-              <a:rPr b="0" lang="en-US" sz="2000" spc="-1" strike="noStrike">
-                <a:solidFill>
-                  <a:srgbClr val="000000"/>
-                </a:solidFill>
-                <a:uFill>
-                  <a:solidFill>
-                    <a:srgbClr val="ffffff"/>
-                  </a:solidFill>
-                </a:uFill>
-                <a:latin typeface="Arial"/>
-                <a:ea typeface="Arial"/>
-              </a:rPr>
-              <a:t>Found → “Milk”, “Shake”)</a:t>
+              <a:t>Summary: Algorithm Errors &lt;&lt; Database Errors: </a:t>
             </a:r>
             <a:endParaRPr b="0" lang="en-US" sz="1800" spc="-1" strike="noStrike">
               <a:solidFill>
@@ -8127,7 +8129,7 @@
             </a:endParaRPr>
           </a:p>
           <a:p>
-            <a:pPr marL="228600" indent="-99720">
+            <a:pPr marL="228600" indent="-99360">
               <a:lnSpc>
                 <a:spcPct val="100000"/>
               </a:lnSpc>
@@ -8148,14 +8150,61 @@
                   </a:solidFill>
                 </a:uFill>
                 <a:latin typeface="Arial"/>
-                <a:ea typeface="Arial"/>
+                <a:ea typeface="DejaVu Sans"/>
               </a:rPr>
-              <a:t>Summary: Algorithm Errors &lt;&lt; Database Errors: </a:t>
+              <a:t> </a:t>
             </a:r>
-            <a:r>
-              <a:rPr b="0" lang="en-US" sz="2000" spc="-1" strike="noStrike">
-                <a:solidFill>
-                  <a:srgbClr val="000000"/>
+            <a:endParaRPr b="0" lang="en-US" sz="1800" spc="-1" strike="noStrike">
+              <a:solidFill>
+                <a:srgbClr val="000000"/>
+              </a:solidFill>
+              <a:uFill>
+                <a:solidFill>
+                  <a:srgbClr val="ffffff"/>
+                </a:solidFill>
+              </a:uFill>
+              <a:latin typeface="Arial"/>
+            </a:endParaRPr>
+          </a:p>
+        </p:txBody>
+      </p:sp>
+      <p:sp>
+        <p:nvSpPr>
+          <p:cNvPr id="136" name="CustomShape 3"/>
+          <p:cNvSpPr/>
+          <p:nvPr/>
+        </p:nvSpPr>
+        <p:spPr>
+          <a:xfrm>
+            <a:off x="6774120" y="4688280"/>
+            <a:ext cx="2131560" cy="272520"/>
+          </a:xfrm>
+          <a:prstGeom prst="rect">
+            <a:avLst/>
+          </a:prstGeom>
+          <a:noFill/>
+          <a:ln>
+            <a:noFill/>
+          </a:ln>
+        </p:spPr>
+        <p:style>
+          <a:lnRef idx="0"/>
+          <a:fillRef idx="0"/>
+          <a:effectRef idx="0"/>
+          <a:fontRef idx="minor"/>
+        </p:style>
+        <p:txBody>
+          <a:bodyPr lIns="90000" rIns="90000" tIns="45000" bIns="45000" anchor="ctr"/>
+          <a:p>
+            <a:pPr algn="r">
+              <a:lnSpc>
+                <a:spcPct val="100000"/>
+              </a:lnSpc>
+            </a:pPr>
+            <a:fld id="{7B013544-368E-4D89-9A08-46B6FD5CF399}" type="slidenum">
+              <a:rPr b="0" lang="en-US" sz="1200" spc="-1" strike="noStrike">
+                <a:solidFill>
+                  <a:srgbClr val="888888"/>
                 </a:solidFill>
                 <a:uFill>
                   <a:solidFill>
@@ -8165,84 +8214,7 @@
                 <a:latin typeface="Arial"/>
                 <a:ea typeface="Arial"/>
               </a:rPr>
-              <a:t>
-</a:t>
-            </a:r>
-            <a:r>
-              <a:rPr b="0" lang="en-US" sz="2000" spc="-1" strike="noStrike">
-                <a:solidFill>
-                  <a:srgbClr val="000000"/>
-                </a:solidFill>
-                <a:uFill>
-                  <a:solidFill>
-                    <a:srgbClr val="ffffff"/>
-                  </a:solidFill>
-                </a:uFill>
-                <a:latin typeface="Arial"/>
-              </a:rPr>
-              <a:t> </a:t>
-            </a:r>
-            <a:endParaRPr b="0" lang="en-US" sz="1800" spc="-1" strike="noStrike">
-              <a:solidFill>
-                <a:srgbClr val="000000"/>
-              </a:solidFill>
-              <a:uFill>
-                <a:solidFill>
-                  <a:srgbClr val="ffffff"/>
-                </a:solidFill>
-              </a:uFill>
-              <a:latin typeface="Arial"/>
-            </a:endParaRPr>
-          </a:p>
-        </p:txBody>
-      </p:sp>
-      <p:sp>
-        <p:nvSpPr>
-          <p:cNvPr id="136" name="CustomShape 3"/>
-          <p:cNvSpPr/>
-          <p:nvPr/>
-        </p:nvSpPr>
-        <p:spPr>
-          <a:xfrm>
-            <a:off x="6774120" y="4688280"/>
-            <a:ext cx="2131920" cy="272880"/>
-          </a:xfrm>
-          <a:prstGeom prst="rect">
-            <a:avLst/>
-          </a:prstGeom>
-          <a:noFill/>
-          <a:ln>
-            <a:noFill/>
-          </a:ln>
-        </p:spPr>
-        <p:style>
-          <a:lnRef idx="0"/>
-          <a:fillRef idx="0"/>
-          <a:effectRef idx="0"/>
-          <a:fontRef idx="minor"/>
-        </p:style>
-        <p:txBody>
-          <a:bodyPr lIns="90000" rIns="90000" tIns="45000" bIns="45000" anchor="ctr"/>
-          <a:p>
-            <a:pPr algn="r">
-              <a:lnSpc>
-                <a:spcPct val="100000"/>
-              </a:lnSpc>
-            </a:pPr>
-            <a:fld id="{E4055E91-8A85-492C-B758-7C7963F6FD47}" type="slidenum">
-              <a:rPr b="0" lang="en-US" sz="1200" spc="-1" strike="noStrike">
-                <a:solidFill>
-                  <a:srgbClr val="888888"/>
-                </a:solidFill>
-                <a:uFill>
-                  <a:solidFill>
-                    <a:srgbClr val="ffffff"/>
-                  </a:solidFill>
-                </a:uFill>
-                <a:latin typeface="Arial"/>
-                <a:ea typeface="Arial"/>
-              </a:rPr>
-              <a:t>1</a:t>
+              <a:t>&lt;number&gt;</a:t>
             </a:fld>
             <a:endParaRPr b="0" lang="en-US" sz="1800" spc="-1" strike="noStrike">
               <a:solidFill>
@@ -8319,7 +8291,7 @@
         <p:spPr>
           <a:xfrm>
             <a:off x="443160" y="326880"/>
-            <a:ext cx="7315200" cy="855360"/>
+            <a:ext cx="7314840" cy="855000"/>
           </a:xfrm>
           <a:prstGeom prst="rect">
             <a:avLst/>
@@ -8356,7 +8328,7 @@
                 <a:latin typeface="Arial"/>
                 <a:ea typeface="Arial"/>
               </a:rPr>
-              <a:t>Common False Positives </a:t>
+              <a:t>Common False Positives:</a:t>
             </a:r>
             <a:endParaRPr b="0" lang="en-US" sz="1800" spc="-1" strike="noStrike">
               <a:solidFill>
@@ -8414,7 +8386,7 @@
         <p:spPr>
           <a:xfrm>
             <a:off x="386640" y="1303920"/>
-            <a:ext cx="7984080" cy="3286440"/>
+            <a:ext cx="7983720" cy="3286080"/>
           </a:xfrm>
           <a:prstGeom prst="rect">
             <a:avLst/>
@@ -8433,7 +8405,7 @@
         <p:txBody>
           <a:bodyPr lIns="90000" rIns="90000" tIns="91440" bIns="91440"/>
           <a:p>
-            <a:pPr marL="228600" indent="-99720">
+            <a:pPr marL="228600" indent="-99360">
               <a:lnSpc>
                 <a:spcPct val="100000"/>
               </a:lnSpc>
@@ -8456,7 +8428,7 @@
                 <a:latin typeface="Arial"/>
                 <a:ea typeface="Arial"/>
               </a:rPr>
-              <a:t>Word → “Honey”</a:t>
+              <a:t>Word → “Duck”</a:t>
             </a:r>
             <a:endParaRPr b="0" lang="en-US" sz="1800" spc="-1" strike="noStrike">
               <a:solidFill>
@@ -8471,7 +8443,7 @@
             </a:endParaRPr>
           </a:p>
           <a:p>
-            <a:pPr marL="228600" indent="-99720">
+            <a:pPr marL="228600" indent="-99360">
               <a:lnSpc>
                 <a:spcPct val="100000"/>
               </a:lnSpc>
@@ -8509,7 +8481,7 @@
             </a:endParaRPr>
           </a:p>
           <a:p>
-            <a:pPr lvl="1" marL="432000" indent="-214920">
+            <a:pPr lvl="1" marL="432000" indent="-214560">
               <a:lnSpc>
                 <a:spcPct val="100000"/>
               </a:lnSpc>
@@ -8521,7 +8493,7 @@
               <a:buChar char=""/>
             </a:pPr>
             <a:r>
-              <a:rPr b="0" lang="en-US" sz="1200" spc="-1" strike="noStrike">
+              <a:rPr b="0" lang="en-US" sz="1300" spc="-1" strike="noStrike">
                 <a:solidFill>
                   <a:srgbClr val="000000"/>
                 </a:solidFill>
@@ -8533,7 +8505,7 @@
                 <a:latin typeface="Arial"/>
                 <a:ea typeface="Arial"/>
               </a:rPr>
-              <a:t>Please pour some honey on the top. → hedge.v.01</a:t>
+              <a:t>that's (.) Donald Duck → duck.n.03</a:t>
             </a:r>
             <a:endParaRPr b="0" lang="en-US" sz="1800" spc="-1" strike="noStrike">
               <a:solidFill>
@@ -8548,7 +8520,7 @@
             </a:endParaRPr>
           </a:p>
           <a:p>
-            <a:pPr lvl="1" marL="432000" indent="-214920">
+            <a:pPr lvl="1" marL="432000" indent="-214560">
               <a:lnSpc>
                 <a:spcPct val="100000"/>
               </a:lnSpc>
@@ -8560,7 +8532,7 @@
               <a:buChar char=""/>
             </a:pPr>
             <a:r>
-              <a:rPr b="0" lang="en-US" sz="1200" spc="-1" strike="noStrike">
+              <a:rPr b="0" lang="en-US" sz="1300" spc="-1" strike="noStrike">
                 <a:solidFill>
                   <a:srgbClr val="000000"/>
                 </a:solidFill>
@@ -8572,7 +8544,7 @@
                 <a:latin typeface="Arial"/>
                 <a:ea typeface="Arial"/>
               </a:rPr>
-              <a:t>I love you honey → hedge.v.01</a:t>
+              <a:t>this xxx was the Duck_Tales → hedge.v.01</a:t>
             </a:r>
             <a:endParaRPr b="0" lang="en-US" sz="1800" spc="-1" strike="noStrike">
               <a:solidFill>
@@ -8587,7 +8559,7 @@
             </a:endParaRPr>
           </a:p>
           <a:p>
-            <a:pPr marL="228600" indent="-99720">
+            <a:pPr marL="228600" indent="-99360">
               <a:lnSpc>
                 <a:spcPct val="100000"/>
               </a:lnSpc>
@@ -8610,7 +8582,7 @@
                 <a:latin typeface="Arial"/>
                 <a:ea typeface="Arial"/>
               </a:rPr>
-              <a:t>(Synset('honey.n.01'), u'a sweet yellow liquid produced by bees')</a:t>
+              <a:t>(Synset('duck.n.01'), u'small wild or domesticated web-footed broad-billed swimming bird usually having a depressed body and short legs')</a:t>
             </a:r>
             <a:endParaRPr b="0" lang="en-US" sz="1800" spc="-1" strike="noStrike">
               <a:solidFill>
@@ -8625,7 +8597,7 @@
             </a:endParaRPr>
           </a:p>
           <a:p>
-            <a:pPr marL="228600" indent="-99720">
+            <a:pPr marL="228600" indent="-99360">
               <a:lnSpc>
                 <a:spcPct val="100000"/>
               </a:lnSpc>
@@ -8648,7 +8620,7 @@
                 <a:latin typeface="Arial"/>
                 <a:ea typeface="Arial"/>
               </a:rPr>
-              <a:t>(Synset('beloved.n.01'), u'a beloved person; used as terms of endearment')</a:t>
+              <a:t>(Synset('duck.n.02'), u'(cricket) a score of nothing by a batsman')</a:t>
             </a:r>
             <a:endParaRPr b="0" lang="en-US" sz="1800" spc="-1" strike="noStrike">
               <a:solidFill>
@@ -8663,7 +8635,7 @@
             </a:endParaRPr>
           </a:p>
           <a:p>
-            <a:pPr marL="228600" indent="-99720">
+            <a:pPr marL="228600" indent="-99360">
               <a:lnSpc>
                 <a:spcPct val="100000"/>
               </a:lnSpc>
@@ -8686,7 +8658,7 @@
                 <a:latin typeface="Arial"/>
                 <a:ea typeface="Arial"/>
               </a:rPr>
-              <a:t>(Synset('honey.v.01'), u'sweeten with honey')</a:t>
+              <a:t>(Synset('duck.n.03'), u'flesh of a duck (domestic or wild)')</a:t>
             </a:r>
             <a:endParaRPr b="0" lang="en-US" sz="1800" spc="-1" strike="noStrike">
               <a:solidFill>
@@ -8701,7 +8673,7 @@
             </a:endParaRPr>
           </a:p>
           <a:p>
-            <a:pPr marL="228600" indent="-99720">
+            <a:pPr marL="228600" indent="-99360">
               <a:lnSpc>
                 <a:spcPct val="100000"/>
               </a:lnSpc>
@@ -8724,7 +8696,7 @@
                 <a:latin typeface="Arial"/>
                 <a:ea typeface="Arial"/>
               </a:rPr>
-              <a:t>(Synset('honey.s.01'), u'of something having the color of honey')</a:t>
+              <a:t>(Synset('duck.n.04'), u'a heavy cotton fabric of plain weave; used for clothing and tents')</a:t>
             </a:r>
             <a:endParaRPr b="0" lang="en-US" sz="1800" spc="-1" strike="noStrike">
               <a:solidFill>
@@ -8738,45 +8710,21 @@
               <a:latin typeface="Arial"/>
             </a:endParaRPr>
           </a:p>
-        </p:txBody>
-      </p:sp>
-      <p:sp>
-        <p:nvSpPr>
-          <p:cNvPr id="139" name="CustomShape 3"/>
-          <p:cNvSpPr/>
-          <p:nvPr/>
-        </p:nvSpPr>
-        <p:spPr>
-          <a:xfrm>
-            <a:off x="6774120" y="4688280"/>
-            <a:ext cx="2131920" cy="272880"/>
-          </a:xfrm>
-          <a:prstGeom prst="rect">
-            <a:avLst/>
-          </a:prstGeom>
-          <a:noFill/>
-          <a:ln>
-            <a:noFill/>
-          </a:ln>
-        </p:spPr>
-        <p:style>
-          <a:lnRef idx="0"/>
-          <a:fillRef idx="0"/>
-          <a:effectRef idx="0"/>
-          <a:fontRef idx="minor"/>
-        </p:style>
-        <p:txBody>
-          <a:bodyPr lIns="90000" rIns="90000" tIns="45000" bIns="45000" anchor="ctr"/>
-          <a:p>
-            <a:pPr algn="r">
+          <a:p>
+            <a:pPr marL="228600" indent="-99360">
               <a:lnSpc>
                 <a:spcPct val="100000"/>
               </a:lnSpc>
+              <a:buClr>
+                <a:srgbClr val="990000"/>
+              </a:buClr>
+              <a:buFont typeface="Arial"/>
+              <a:buChar char="•"/>
             </a:pPr>
-            <a:fld id="{5B543C1E-6C32-4C48-98DD-366526AA223E}" type="slidenum">
-              <a:rPr b="0" lang="en-US" sz="1200" spc="-1" strike="noStrike">
-                <a:solidFill>
-                  <a:srgbClr val="888888"/>
+            <a:r>
+              <a:rPr b="0" lang="en-US" sz="900" spc="-1" strike="noStrike">
+                <a:solidFill>
+                  <a:srgbClr val="000000"/>
                 </a:solidFill>
                 <a:uFill>
                   <a:solidFill>
@@ -8786,7 +8734,259 @@
                 <a:latin typeface="Arial"/>
                 <a:ea typeface="Arial"/>
               </a:rPr>
-              <a:t>1</a:t>
+              <a:t>(Synset('duck.v.01'), u'to move (the head or body) quickly downwards or away')</a:t>
+            </a:r>
+            <a:endParaRPr b="0" lang="en-US" sz="1800" spc="-1" strike="noStrike">
+              <a:solidFill>
+                <a:srgbClr val="000000"/>
+              </a:solidFill>
+              <a:uFill>
+                <a:solidFill>
+                  <a:srgbClr val="ffffff"/>
+                </a:solidFill>
+              </a:uFill>
+              <a:latin typeface="Arial"/>
+            </a:endParaRPr>
+          </a:p>
+          <a:p>
+            <a:pPr marL="228600" indent="-99360">
+              <a:lnSpc>
+                <a:spcPct val="100000"/>
+              </a:lnSpc>
+              <a:buClr>
+                <a:srgbClr val="990000"/>
+              </a:buClr>
+              <a:buFont typeface="Arial"/>
+              <a:buChar char="•"/>
+            </a:pPr>
+            <a:r>
+              <a:rPr b="0" lang="en-US" sz="900" spc="-1" strike="noStrike">
+                <a:solidFill>
+                  <a:srgbClr val="000000"/>
+                </a:solidFill>
+                <a:uFill>
+                  <a:solidFill>
+                    <a:srgbClr val="ffffff"/>
+                  </a:solidFill>
+                </a:uFill>
+                <a:latin typeface="Arial"/>
+                <a:ea typeface="Arial"/>
+              </a:rPr>
+              <a:t>(Synset('duck.v.02'), u'submerge or plunge suddenly')</a:t>
+            </a:r>
+            <a:endParaRPr b="0" lang="en-US" sz="1800" spc="-1" strike="noStrike">
+              <a:solidFill>
+                <a:srgbClr val="000000"/>
+              </a:solidFill>
+              <a:uFill>
+                <a:solidFill>
+                  <a:srgbClr val="ffffff"/>
+                </a:solidFill>
+              </a:uFill>
+              <a:latin typeface="Arial"/>
+            </a:endParaRPr>
+          </a:p>
+          <a:p>
+            <a:pPr marL="228600" indent="-99360">
+              <a:lnSpc>
+                <a:spcPct val="100000"/>
+              </a:lnSpc>
+              <a:buClr>
+                <a:srgbClr val="990000"/>
+              </a:buClr>
+              <a:buFont typeface="Arial"/>
+              <a:buChar char="•"/>
+            </a:pPr>
+            <a:r>
+              <a:rPr b="0" lang="en-US" sz="900" spc="-1" strike="noStrike">
+                <a:solidFill>
+                  <a:srgbClr val="000000"/>
+                </a:solidFill>
+                <a:uFill>
+                  <a:solidFill>
+                    <a:srgbClr val="ffffff"/>
+                  </a:solidFill>
+                </a:uFill>
+                <a:latin typeface="Arial"/>
+                <a:ea typeface="Arial"/>
+              </a:rPr>
+              <a:t>(Synset('dip.v.10'), u'dip into a liquid')</a:t>
+            </a:r>
+            <a:endParaRPr b="0" lang="en-US" sz="1800" spc="-1" strike="noStrike">
+              <a:solidFill>
+                <a:srgbClr val="000000"/>
+              </a:solidFill>
+              <a:uFill>
+                <a:solidFill>
+                  <a:srgbClr val="ffffff"/>
+                </a:solidFill>
+              </a:uFill>
+              <a:latin typeface="Arial"/>
+            </a:endParaRPr>
+          </a:p>
+          <a:p>
+            <a:pPr marL="228600" indent="-99360">
+              <a:lnSpc>
+                <a:spcPct val="100000"/>
+              </a:lnSpc>
+              <a:buClr>
+                <a:srgbClr val="990000"/>
+              </a:buClr>
+              <a:buFont typeface="Arial"/>
+              <a:buChar char="•"/>
+            </a:pPr>
+            <a:r>
+              <a:rPr b="0" lang="en-US" sz="900" spc="-1" strike="noStrike">
+                <a:solidFill>
+                  <a:srgbClr val="000000"/>
+                </a:solidFill>
+                <a:uFill>
+                  <a:solidFill>
+                    <a:srgbClr val="ffffff"/>
+                  </a:solidFill>
+                </a:uFill>
+                <a:latin typeface="Arial"/>
+                <a:ea typeface="Arial"/>
+              </a:rPr>
+              <a:t>(Synset('hedge.v.01'), u'avoid or try to avoid fulfilling, answering, or performing (duties, questions, or issues)')</a:t>
+            </a:r>
+            <a:endParaRPr b="0" lang="en-US" sz="1800" spc="-1" strike="noStrike">
+              <a:solidFill>
+                <a:srgbClr val="000000"/>
+              </a:solidFill>
+              <a:uFill>
+                <a:solidFill>
+                  <a:srgbClr val="ffffff"/>
+                </a:solidFill>
+              </a:uFill>
+              <a:latin typeface="Arial"/>
+            </a:endParaRPr>
+          </a:p>
+          <a:p>
+            <a:pPr marL="228600" indent="-99360">
+              <a:lnSpc>
+                <a:spcPct val="100000"/>
+              </a:lnSpc>
+              <a:buClr>
+                <a:srgbClr val="990000"/>
+              </a:buClr>
+              <a:buFont typeface="Arial"/>
+              <a:buChar char="•"/>
+            </a:pPr>
+            <a:r>
+              <a:rPr b="0" lang="en-US" sz="900" spc="-1" strike="noStrike">
+                <a:solidFill>
+                  <a:srgbClr val="000000"/>
+                </a:solidFill>
+                <a:uFill>
+                  <a:solidFill>
+                    <a:srgbClr val="ffffff"/>
+                  </a:solidFill>
+                </a:uFill>
+                <a:latin typeface="Arial"/>
+                <a:ea typeface="Arial"/>
+              </a:rPr>
+              <a:t> </a:t>
+            </a:r>
+            <a:endParaRPr b="0" lang="en-US" sz="1800" spc="-1" strike="noStrike">
+              <a:solidFill>
+                <a:srgbClr val="000000"/>
+              </a:solidFill>
+              <a:uFill>
+                <a:solidFill>
+                  <a:srgbClr val="ffffff"/>
+                </a:solidFill>
+              </a:uFill>
+              <a:latin typeface="Arial"/>
+            </a:endParaRPr>
+          </a:p>
+          <a:p>
+            <a:pPr marL="228600" indent="-99360">
+              <a:lnSpc>
+                <a:spcPct val="100000"/>
+              </a:lnSpc>
+              <a:buClr>
+                <a:srgbClr val="990000"/>
+              </a:buClr>
+              <a:buFont typeface="Arial"/>
+              <a:buChar char="•"/>
+            </a:pPr>
+            <a:r>
+              <a:rPr b="0" lang="en-US" sz="2000" spc="-1" strike="noStrike">
+                <a:solidFill>
+                  <a:srgbClr val="000000"/>
+                </a:solidFill>
+                <a:uFill>
+                  <a:solidFill>
+                    <a:srgbClr val="ffffff"/>
+                  </a:solidFill>
+                </a:uFill>
+                <a:latin typeface="Arial"/>
+                <a:ea typeface="Arial"/>
+              </a:rPr>
+              <a:t> </a:t>
+            </a:r>
+            <a:endParaRPr b="0" lang="en-US" sz="1800" spc="-1" strike="noStrike">
+              <a:solidFill>
+                <a:srgbClr val="000000"/>
+              </a:solidFill>
+              <a:uFill>
+                <a:solidFill>
+                  <a:srgbClr val="ffffff"/>
+                </a:solidFill>
+              </a:uFill>
+              <a:latin typeface="Arial"/>
+            </a:endParaRPr>
+          </a:p>
+        </p:txBody>
+      </p:sp>
+      <p:sp>
+        <p:nvSpPr>
+          <p:cNvPr id="139" name="CustomShape 3"/>
+          <p:cNvSpPr/>
+          <p:nvPr/>
+        </p:nvSpPr>
+        <p:spPr>
+          <a:xfrm>
+            <a:off x="6774120" y="4688280"/>
+            <a:ext cx="2131560" cy="272520"/>
+          </a:xfrm>
+          <a:prstGeom prst="rect">
+            <a:avLst/>
+          </a:prstGeom>
+          <a:noFill/>
+          <a:ln>
+            <a:noFill/>
+          </a:ln>
+        </p:spPr>
+        <p:style>
+          <a:lnRef idx="0"/>
+          <a:fillRef idx="0"/>
+          <a:effectRef idx="0"/>
+          <a:fontRef idx="minor"/>
+        </p:style>
+        <p:txBody>
+          <a:bodyPr lIns="90000" rIns="90000" tIns="45000" bIns="45000" anchor="ctr"/>
+          <a:p>
+            <a:pPr algn="r">
+              <a:lnSpc>
+                <a:spcPct val="100000"/>
+              </a:lnSpc>
+            </a:pPr>
+            <a:fld id="{20A415BB-0E83-4627-A221-88E89041D1D3}" type="slidenum">
+              <a:rPr b="0" lang="en-US" sz="1200" spc="-1" strike="noStrike">
+                <a:solidFill>
+                  <a:srgbClr val="888888"/>
+                </a:solidFill>
+                <a:uFill>
+                  <a:solidFill>
+                    <a:srgbClr val="ffffff"/>
+                  </a:solidFill>
+                </a:uFill>
+                <a:latin typeface="Arial"/>
+                <a:ea typeface="Arial"/>
+              </a:rPr>
+              <a:t>&lt;number&gt;</a:t>
             </a:fld>
             <a:endParaRPr b="0" lang="en-US" sz="1800" spc="-1" strike="noStrike">
               <a:solidFill>
@@ -8863,7 +9063,7 @@
         <p:spPr>
           <a:xfrm>
             <a:off x="443160" y="326880"/>
-            <a:ext cx="7315200" cy="855360"/>
+            <a:ext cx="7314840" cy="855000"/>
           </a:xfrm>
           <a:prstGeom prst="rect">
             <a:avLst/>
@@ -8900,40 +9100,7 @@
                 <a:latin typeface="Arial"/>
                 <a:ea typeface="Arial"/>
               </a:rPr>
-              <a:t>Common False Positives:</a:t>
-            </a:r>
-            <a:endParaRPr b="0" lang="en-US" sz="1800" spc="-1" strike="noStrike">
-              <a:solidFill>
-                <a:srgbClr val="000000"/>
-              </a:solidFill>
-              <a:uFill>
-                <a:solidFill>
-                  <a:srgbClr val="ffffff"/>
-                </a:solidFill>
-              </a:uFill>
-              <a:latin typeface="Arial"/>
-            </a:endParaRPr>
-          </a:p>
-          <a:p>
-            <a:pPr>
-              <a:lnSpc>
-                <a:spcPct val="100000"/>
-              </a:lnSpc>
-            </a:pPr>
-            <a:r>
-              <a:rPr b="1" lang="en-US" sz="2800" spc="-1" strike="noStrike">
-                <a:solidFill>
-                  <a:srgbClr val="861119"/>
-                </a:solidFill>
-                <a:uFill>
-                  <a:solidFill>
-                    <a:srgbClr val="ffffff"/>
-                  </a:solidFill>
-                </a:uFill>
-                <a:latin typeface="Arial"/>
-                <a:ea typeface="Arial"/>
-              </a:rPr>
-              <a:t>(Lesk – Word Sense Disambiguation):</a:t>
+              <a:t>References:</a:t>
             </a:r>
             <a:endParaRPr b="0" lang="en-US" sz="1800" spc="-1" strike="noStrike">
               <a:solidFill>
@@ -8958,7 +9125,7 @@
         <p:spPr>
           <a:xfrm>
             <a:off x="386640" y="1303920"/>
-            <a:ext cx="7984080" cy="3286440"/>
+            <a:ext cx="7983720" cy="3286080"/>
           </a:xfrm>
           <a:prstGeom prst="rect">
             <a:avLst/>
@@ -8977,7 +9144,7 @@
         <p:txBody>
           <a:bodyPr lIns="90000" rIns="90000" tIns="91440" bIns="91440"/>
           <a:p>
-            <a:pPr marL="228600" indent="-99720">
+            <a:pPr marL="228600" indent="-99360">
               <a:lnSpc>
                 <a:spcPct val="100000"/>
               </a:lnSpc>
@@ -8988,7 +9155,7 @@
               <a:buChar char="•"/>
             </a:pPr>
             <a:r>
-              <a:rPr b="0" lang="en-US" sz="2000" spc="-1" strike="noStrike">
+              <a:rPr b="0" lang="en-US" sz="1200" spc="-1" strike="noStrike">
                 <a:solidFill>
                   <a:srgbClr val="000000"/>
                 </a:solidFill>
@@ -9000,7 +9167,37 @@
                 <a:latin typeface="Arial"/>
                 <a:ea typeface="Arial"/>
               </a:rPr>
-              <a:t>Word → “Duck”</a:t>
+              <a:t>“</a:t>
+            </a:r>
+            <a:r>
+              <a:rPr b="0" i="1" lang="en-US" sz="1200" spc="-1" strike="noStrike">
+                <a:solidFill>
+                  <a:srgbClr val="000000"/>
+                </a:solidFill>
+                <a:uFill>
+                  <a:solidFill>
+                    <a:srgbClr val="ffffff"/>
+                  </a:solidFill>
+                </a:uFill>
+                <a:latin typeface="Arial"/>
+                <a:ea typeface="Arial"/>
+              </a:rPr>
+              <a:t>Speech2Health: A Mobile Framework for Monitoring Dietary Composition from Spoken Data</a:t>
+            </a:r>
+            <a:r>
+              <a:rPr b="0" lang="en-US" sz="1200" spc="-1" strike="noStrike">
+                <a:solidFill>
+                  <a:srgbClr val="000000"/>
+                </a:solidFill>
+                <a:uFill>
+                  <a:solidFill>
+                    <a:srgbClr val="ffffff"/>
+                  </a:solidFill>
+                </a:uFill>
+                <a:latin typeface="Arial"/>
+                <a:ea typeface="Arial"/>
+              </a:rPr>
+              <a:t>”. Niloofar Hezarjaribi, Sepideh Mazrouee, Hassan Ghasemzadeh. IEEE JOURNAL OF BIOMEDICAL AND HEALTH INFORMATICS, 2017.</a:t>
             </a:r>
             <a:endParaRPr b="0" lang="en-US" sz="1800" spc="-1" strike="noStrike">
               <a:solidFill>
@@ -9015,7 +9212,7 @@
             </a:endParaRPr>
           </a:p>
           <a:p>
-            <a:pPr marL="228600" indent="-99720">
+            <a:pPr marL="228600" indent="-99360">
               <a:lnSpc>
                 <a:spcPct val="100000"/>
               </a:lnSpc>
@@ -9026,7 +9223,7 @@
               <a:buChar char="•"/>
             </a:pPr>
             <a:r>
-              <a:rPr b="0" lang="en-US" sz="2000" spc="-1" strike="noStrike">
+              <a:rPr b="0" lang="en-US" sz="1200" spc="-1" strike="noStrike">
                 <a:solidFill>
                   <a:srgbClr val="000000"/>
                 </a:solidFill>
@@ -9038,34 +9235,10 @@
                 <a:latin typeface="Arial"/>
                 <a:ea typeface="Arial"/>
               </a:rPr>
-              <a:t>Usage </a:t>
+              <a:t>“</a:t>
             </a:r>
-            <a:endParaRPr b="0" lang="en-US" sz="1800" spc="-1" strike="noStrike">
-              <a:solidFill>
-                <a:srgbClr val="000000"/>
-              </a:solidFill>
-              <a:uFill>
-                <a:solidFill>
-                  <a:srgbClr val="ffffff"/>
-                </a:solidFill>
-              </a:uFill>
-              <a:latin typeface="Arial"/>
-            </a:endParaRPr>
-          </a:p>
-          <a:p>
-            <a:pPr lvl="1" marL="432000" indent="-214920">
-              <a:lnSpc>
-                <a:spcPct val="100000"/>
-              </a:lnSpc>
-              <a:buClr>
-                <a:srgbClr val="000000"/>
-              </a:buClr>
-              <a:buSzPct val="45000"/>
-              <a:buFont typeface="Wingdings" charset="2"/>
-              <a:buChar char=""/>
-            </a:pPr>
             <a:r>
-              <a:rPr b="0" lang="en-US" sz="1300" spc="-1" strike="noStrike">
+              <a:rPr b="0" i="1" lang="en-US" sz="1200" spc="-1" strike="noStrike">
                 <a:solidFill>
                   <a:srgbClr val="000000"/>
                 </a:solidFill>
@@ -9077,34 +9250,10 @@
                 <a:latin typeface="Arial"/>
                 <a:ea typeface="Arial"/>
               </a:rPr>
-              <a:t>that's (.) Donald Duck → duck.n.03</a:t>
+              <a:t>S2NI: A Mobile Platform for Nutrition Monitoring from Spoken Data</a:t>
             </a:r>
-            <a:endParaRPr b="0" lang="en-US" sz="1800" spc="-1" strike="noStrike">
-              <a:solidFill>
-                <a:srgbClr val="000000"/>
-              </a:solidFill>
-              <a:uFill>
-                <a:solidFill>
-                  <a:srgbClr val="ffffff"/>
-                </a:solidFill>
-              </a:uFill>
-              <a:latin typeface="Arial"/>
-            </a:endParaRPr>
-          </a:p>
-          <a:p>
-            <a:pPr lvl="1" marL="432000" indent="-214920">
-              <a:lnSpc>
-                <a:spcPct val="100000"/>
-              </a:lnSpc>
-              <a:buClr>
-                <a:srgbClr val="000000"/>
-              </a:buClr>
-              <a:buSzPct val="45000"/>
-              <a:buFont typeface="Wingdings" charset="2"/>
-              <a:buChar char=""/>
-            </a:pPr>
             <a:r>
-              <a:rPr b="0" lang="en-US" sz="1300" spc="-1" strike="noStrike">
+              <a:rPr b="0" lang="en-US" sz="1200" spc="-1" strike="noStrike">
                 <a:solidFill>
                   <a:srgbClr val="000000"/>
                 </a:solidFill>
@@ -9116,7 +9265,7 @@
                 <a:latin typeface="Arial"/>
                 <a:ea typeface="Arial"/>
               </a:rPr>
-              <a:t>this xxx was the Duck_Tales → hedge.v.01</a:t>
+              <a:t>”. Niloofar Hezarjaribi, Cody A. Reynold, Drew T. Miller, Naomi Chaytor, Hassan Ghasemzadeh. IEEE Engineering in Medicine and Biology Society. 2016</a:t>
             </a:r>
             <a:endParaRPr b="0" lang="en-US" sz="1800" spc="-1" strike="noStrike">
               <a:solidFill>
@@ -9131,20 +9280,80 @@
             </a:endParaRPr>
           </a:p>
           <a:p>
-            <a:pPr marL="228600" indent="-99720">
+            <a:pPr>
               <a:lnSpc>
                 <a:spcPct val="100000"/>
               </a:lnSpc>
-              <a:buClr>
-                <a:srgbClr val="990000"/>
-              </a:buClr>
-              <a:buFont typeface="Arial"/>
-              <a:buChar char="•"/>
             </a:pPr>
-            <a:r>
-              <a:rPr b="0" lang="en-US" sz="900" spc="-1" strike="noStrike">
-                <a:solidFill>
-                  <a:srgbClr val="000000"/>
+            <a:endParaRPr b="0" lang="en-US" sz="1800" spc="-1" strike="noStrike">
+              <a:solidFill>
+                <a:srgbClr val="000000"/>
+              </a:solidFill>
+              <a:uFill>
+                <a:solidFill>
+                  <a:srgbClr val="ffffff"/>
+                </a:solidFill>
+              </a:uFill>
+              <a:latin typeface="Arial"/>
+            </a:endParaRPr>
+          </a:p>
+          <a:p>
+            <a:pPr>
+              <a:lnSpc>
+                <a:spcPct val="100000"/>
+              </a:lnSpc>
+            </a:pPr>
+            <a:endParaRPr b="0" lang="en-US" sz="1800" spc="-1" strike="noStrike">
+              <a:solidFill>
+                <a:srgbClr val="000000"/>
+              </a:solidFill>
+              <a:uFill>
+                <a:solidFill>
+                  <a:srgbClr val="ffffff"/>
+                </a:solidFill>
+              </a:uFill>
+              <a:latin typeface="Arial"/>
+            </a:endParaRPr>
+          </a:p>
+        </p:txBody>
+      </p:sp>
+      <p:sp>
+        <p:nvSpPr>
+          <p:cNvPr id="142" name="CustomShape 3"/>
+          <p:cNvSpPr/>
+          <p:nvPr/>
+        </p:nvSpPr>
+        <p:spPr>
+          <a:xfrm>
+            <a:off x="6774120" y="4688280"/>
+            <a:ext cx="2131560" cy="272520"/>
+          </a:xfrm>
+          <a:prstGeom prst="rect">
+            <a:avLst/>
+          </a:prstGeom>
+          <a:noFill/>
+          <a:ln>
+            <a:noFill/>
+          </a:ln>
+        </p:spPr>
+        <p:style>
+          <a:lnRef idx="0"/>
+          <a:fillRef idx="0"/>
+          <a:effectRef idx="0"/>
+          <a:fontRef idx="minor"/>
+        </p:style>
+        <p:txBody>
+          <a:bodyPr lIns="90000" rIns="90000" tIns="45000" bIns="45000" anchor="ctr"/>
+          <a:p>
+            <a:pPr algn="r">
+              <a:lnSpc>
+                <a:spcPct val="100000"/>
+              </a:lnSpc>
+            </a:pPr>
+            <a:fld id="{F918BD67-5D31-4C8C-BDF8-CFD335CB2168}" type="slidenum">
+              <a:rPr b="0" lang="en-US" sz="1200" spc="-1" strike="noStrike">
+                <a:solidFill>
+                  <a:srgbClr val="888888"/>
                 </a:solidFill>
                 <a:uFill>
                   <a:solidFill>
@@ -9154,411 +9363,7 @@
                 <a:latin typeface="Arial"/>
                 <a:ea typeface="Arial"/>
               </a:rPr>
-              <a:t>(Synset('duck.n.01'), u'small wild or domesticated web-footed broad-billed swimming bird usually having a depressed body and short legs')</a:t>
-            </a:r>
-            <a:endParaRPr b="0" lang="en-US" sz="1800" spc="-1" strike="noStrike">
-              <a:solidFill>
-                <a:srgbClr val="000000"/>
-              </a:solidFill>
-              <a:uFill>
-                <a:solidFill>
-                  <a:srgbClr val="ffffff"/>
-                </a:solidFill>
-              </a:uFill>
-              <a:latin typeface="Arial"/>
-            </a:endParaRPr>
-          </a:p>
-          <a:p>
-            <a:pPr marL="228600" indent="-99720">
-              <a:lnSpc>
-                <a:spcPct val="100000"/>
-              </a:lnSpc>
-              <a:buClr>
-                <a:srgbClr val="990000"/>
-              </a:buClr>
-              <a:buFont typeface="Arial"/>
-              <a:buChar char="•"/>
-            </a:pPr>
-            <a:r>
-              <a:rPr b="0" lang="en-US" sz="900" spc="-1" strike="noStrike">
-                <a:solidFill>
-                  <a:srgbClr val="000000"/>
-                </a:solidFill>
-                <a:uFill>
-                  <a:solidFill>
-                    <a:srgbClr val="ffffff"/>
-                  </a:solidFill>
-                </a:uFill>
-                <a:latin typeface="Arial"/>
-                <a:ea typeface="Arial"/>
-              </a:rPr>
-              <a:t>(Synset('duck.n.02'), u'(cricket) a score of nothing by a batsman')</a:t>
-            </a:r>
-            <a:endParaRPr b="0" lang="en-US" sz="1800" spc="-1" strike="noStrike">
-              <a:solidFill>
-                <a:srgbClr val="000000"/>
-              </a:solidFill>
-              <a:uFill>
-                <a:solidFill>
-                  <a:srgbClr val="ffffff"/>
-                </a:solidFill>
-              </a:uFill>
-              <a:latin typeface="Arial"/>
-            </a:endParaRPr>
-          </a:p>
-          <a:p>
-            <a:pPr marL="228600" indent="-99720">
-              <a:lnSpc>
-                <a:spcPct val="100000"/>
-              </a:lnSpc>
-              <a:buClr>
-                <a:srgbClr val="990000"/>
-              </a:buClr>
-              <a:buFont typeface="Arial"/>
-              <a:buChar char="•"/>
-            </a:pPr>
-            <a:r>
-              <a:rPr b="0" lang="en-US" sz="900" spc="-1" strike="noStrike">
-                <a:solidFill>
-                  <a:srgbClr val="000000"/>
-                </a:solidFill>
-                <a:uFill>
-                  <a:solidFill>
-                    <a:srgbClr val="ffffff"/>
-                  </a:solidFill>
-                </a:uFill>
-                <a:latin typeface="Arial"/>
-                <a:ea typeface="Arial"/>
-              </a:rPr>
-              <a:t>(Synset('duck.n.03'), u'flesh of a duck (domestic or wild)')</a:t>
-            </a:r>
-            <a:endParaRPr b="0" lang="en-US" sz="1800" spc="-1" strike="noStrike">
-              <a:solidFill>
-                <a:srgbClr val="000000"/>
-              </a:solidFill>
-              <a:uFill>
-                <a:solidFill>
-                  <a:srgbClr val="ffffff"/>
-                </a:solidFill>
-              </a:uFill>
-              <a:latin typeface="Arial"/>
-            </a:endParaRPr>
-          </a:p>
-          <a:p>
-            <a:pPr marL="228600" indent="-99720">
-              <a:lnSpc>
-                <a:spcPct val="100000"/>
-              </a:lnSpc>
-              <a:buClr>
-                <a:srgbClr val="990000"/>
-              </a:buClr>
-              <a:buFont typeface="Arial"/>
-              <a:buChar char="•"/>
-            </a:pPr>
-            <a:r>
-              <a:rPr b="0" lang="en-US" sz="900" spc="-1" strike="noStrike">
-                <a:solidFill>
-                  <a:srgbClr val="000000"/>
-                </a:solidFill>
-                <a:uFill>
-                  <a:solidFill>
-                    <a:srgbClr val="ffffff"/>
-                  </a:solidFill>
-                </a:uFill>
-                <a:latin typeface="Arial"/>
-                <a:ea typeface="Arial"/>
-              </a:rPr>
-              <a:t>(Synset('duck.n.04'), u'a heavy cotton fabric of plain weave; used for clothing and tents')</a:t>
-            </a:r>
-            <a:endParaRPr b="0" lang="en-US" sz="1800" spc="-1" strike="noStrike">
-              <a:solidFill>
-                <a:srgbClr val="000000"/>
-              </a:solidFill>
-              <a:uFill>
-                <a:solidFill>
-                  <a:srgbClr val="ffffff"/>
-                </a:solidFill>
-              </a:uFill>
-              <a:latin typeface="Arial"/>
-            </a:endParaRPr>
-          </a:p>
-          <a:p>
-            <a:pPr marL="228600" indent="-99720">
-              <a:lnSpc>
-                <a:spcPct val="100000"/>
-              </a:lnSpc>
-              <a:buClr>
-                <a:srgbClr val="990000"/>
-              </a:buClr>
-              <a:buFont typeface="Arial"/>
-              <a:buChar char="•"/>
-            </a:pPr>
-            <a:r>
-              <a:rPr b="0" lang="en-US" sz="900" spc="-1" strike="noStrike">
-                <a:solidFill>
-                  <a:srgbClr val="000000"/>
-                </a:solidFill>
-                <a:uFill>
-                  <a:solidFill>
-                    <a:srgbClr val="ffffff"/>
-                  </a:solidFill>
-                </a:uFill>
-                <a:latin typeface="Arial"/>
-                <a:ea typeface="Arial"/>
-              </a:rPr>
-              <a:t>(Synset('duck.v.01'), u'to move (the head or body) quickly downwards or away')</a:t>
-            </a:r>
-            <a:endParaRPr b="0" lang="en-US" sz="1800" spc="-1" strike="noStrike">
-              <a:solidFill>
-                <a:srgbClr val="000000"/>
-              </a:solidFill>
-              <a:uFill>
-                <a:solidFill>
-                  <a:srgbClr val="ffffff"/>
-                </a:solidFill>
-              </a:uFill>
-              <a:latin typeface="Arial"/>
-            </a:endParaRPr>
-          </a:p>
-          <a:p>
-            <a:pPr marL="228600" indent="-99720">
-              <a:lnSpc>
-                <a:spcPct val="100000"/>
-              </a:lnSpc>
-              <a:buClr>
-                <a:srgbClr val="990000"/>
-              </a:buClr>
-              <a:buFont typeface="Arial"/>
-              <a:buChar char="•"/>
-            </a:pPr>
-            <a:r>
-              <a:rPr b="0" lang="en-US" sz="900" spc="-1" strike="noStrike">
-                <a:solidFill>
-                  <a:srgbClr val="000000"/>
-                </a:solidFill>
-                <a:uFill>
-                  <a:solidFill>
-                    <a:srgbClr val="ffffff"/>
-                  </a:solidFill>
-                </a:uFill>
-                <a:latin typeface="Arial"/>
-                <a:ea typeface="Arial"/>
-              </a:rPr>
-              <a:t>(Synset('duck.v.02'), u'submerge or plunge suddenly')</a:t>
-            </a:r>
-            <a:endParaRPr b="0" lang="en-US" sz="1800" spc="-1" strike="noStrike">
-              <a:solidFill>
-                <a:srgbClr val="000000"/>
-              </a:solidFill>
-              <a:uFill>
-                <a:solidFill>
-                  <a:srgbClr val="ffffff"/>
-                </a:solidFill>
-              </a:uFill>
-              <a:latin typeface="Arial"/>
-            </a:endParaRPr>
-          </a:p>
-          <a:p>
-            <a:pPr marL="228600" indent="-99720">
-              <a:lnSpc>
-                <a:spcPct val="100000"/>
-              </a:lnSpc>
-              <a:buClr>
-                <a:srgbClr val="990000"/>
-              </a:buClr>
-              <a:buFont typeface="Arial"/>
-              <a:buChar char="•"/>
-            </a:pPr>
-            <a:r>
-              <a:rPr b="0" lang="en-US" sz="900" spc="-1" strike="noStrike">
-                <a:solidFill>
-                  <a:srgbClr val="000000"/>
-                </a:solidFill>
-                <a:uFill>
-                  <a:solidFill>
-                    <a:srgbClr val="ffffff"/>
-                  </a:solidFill>
-                </a:uFill>
-                <a:latin typeface="Arial"/>
-                <a:ea typeface="Arial"/>
-              </a:rPr>
-              <a:t>(Synset('dip.v.10'), u'dip into a liquid')</a:t>
-            </a:r>
-            <a:endParaRPr b="0" lang="en-US" sz="1800" spc="-1" strike="noStrike">
-              <a:solidFill>
-                <a:srgbClr val="000000"/>
-              </a:solidFill>
-              <a:uFill>
-                <a:solidFill>
-                  <a:srgbClr val="ffffff"/>
-                </a:solidFill>
-              </a:uFill>
-              <a:latin typeface="Arial"/>
-            </a:endParaRPr>
-          </a:p>
-          <a:p>
-            <a:pPr marL="228600" indent="-99720">
-              <a:lnSpc>
-                <a:spcPct val="100000"/>
-              </a:lnSpc>
-              <a:buClr>
-                <a:srgbClr val="990000"/>
-              </a:buClr>
-              <a:buFont typeface="Arial"/>
-              <a:buChar char="•"/>
-            </a:pPr>
-            <a:r>
-              <a:rPr b="0" lang="en-US" sz="900" spc="-1" strike="noStrike">
-                <a:solidFill>
-                  <a:srgbClr val="000000"/>
-                </a:solidFill>
-                <a:uFill>
-                  <a:solidFill>
-                    <a:srgbClr val="ffffff"/>
-                  </a:solidFill>
-                </a:uFill>
-                <a:latin typeface="Arial"/>
-                <a:ea typeface="Arial"/>
-              </a:rPr>
-              <a:t>(Synset('hedge.v.01'), u'avoid or try to avoid fulfilling, answering, or performing (duties, questions, or issues)')</a:t>
-            </a:r>
-            <a:endParaRPr b="0" lang="en-US" sz="1800" spc="-1" strike="noStrike">
-              <a:solidFill>
-                <a:srgbClr val="000000"/>
-              </a:solidFill>
-              <a:uFill>
-                <a:solidFill>
-                  <a:srgbClr val="ffffff"/>
-                </a:solidFill>
-              </a:uFill>
-              <a:latin typeface="Arial"/>
-            </a:endParaRPr>
-          </a:p>
-          <a:p>
-            <a:pPr marL="228600" indent="-99720">
-              <a:lnSpc>
-                <a:spcPct val="100000"/>
-              </a:lnSpc>
-              <a:buClr>
-                <a:srgbClr val="990000"/>
-              </a:buClr>
-              <a:buFont typeface="Arial"/>
-              <a:buChar char="•"/>
-            </a:pPr>
-            <a:r>
-              <a:rPr b="0" lang="en-US" sz="900" spc="-1" strike="noStrike">
-                <a:solidFill>
-                  <a:srgbClr val="000000"/>
-                </a:solidFill>
-                <a:uFill>
-                  <a:solidFill>
-                    <a:srgbClr val="ffffff"/>
-                  </a:solidFill>
-                </a:uFill>
-                <a:latin typeface="Arial"/>
-                <a:ea typeface="Arial"/>
-              </a:rPr>
-              <a:t> </a:t>
-            </a:r>
-            <a:endParaRPr b="0" lang="en-US" sz="1800" spc="-1" strike="noStrike">
-              <a:solidFill>
-                <a:srgbClr val="000000"/>
-              </a:solidFill>
-              <a:uFill>
-                <a:solidFill>
-                  <a:srgbClr val="ffffff"/>
-                </a:solidFill>
-              </a:uFill>
-              <a:latin typeface="Arial"/>
-            </a:endParaRPr>
-          </a:p>
-          <a:p>
-            <a:pPr marL="228600" indent="-99720">
-              <a:lnSpc>
-                <a:spcPct val="100000"/>
-              </a:lnSpc>
-              <a:buClr>
-                <a:srgbClr val="990000"/>
-              </a:buClr>
-              <a:buFont typeface="Arial"/>
-              <a:buChar char="•"/>
-            </a:pPr>
-            <a:r>
-              <a:rPr b="0" lang="en-US" sz="2000" spc="-1" strike="noStrike">
-                <a:solidFill>
-                  <a:srgbClr val="000000"/>
-                </a:solidFill>
-                <a:uFill>
-                  <a:solidFill>
-                    <a:srgbClr val="ffffff"/>
-                  </a:solidFill>
-                </a:uFill>
-                <a:latin typeface="Arial"/>
-                <a:ea typeface="Arial"/>
-              </a:rPr>
-              <a:t> </a:t>
-            </a:r>
-            <a:endParaRPr b="0" lang="en-US" sz="1800" spc="-1" strike="noStrike">
-              <a:solidFill>
-                <a:srgbClr val="000000"/>
-              </a:solidFill>
-              <a:uFill>
-                <a:solidFill>
-                  <a:srgbClr val="ffffff"/>
-                </a:solidFill>
-              </a:uFill>
-              <a:latin typeface="Arial"/>
-            </a:endParaRPr>
-          </a:p>
-        </p:txBody>
-      </p:sp>
-      <p:sp>
-        <p:nvSpPr>
-          <p:cNvPr id="142" name="CustomShape 3"/>
-          <p:cNvSpPr/>
-          <p:nvPr/>
-        </p:nvSpPr>
-        <p:spPr>
-          <a:xfrm>
-            <a:off x="6774120" y="4688280"/>
-            <a:ext cx="2131920" cy="272880"/>
-          </a:xfrm>
-          <a:prstGeom prst="rect">
-            <a:avLst/>
-          </a:prstGeom>
-          <a:noFill/>
-          <a:ln>
-            <a:noFill/>
-          </a:ln>
-        </p:spPr>
-        <p:style>
-          <a:lnRef idx="0"/>
-          <a:fillRef idx="0"/>
-          <a:effectRef idx="0"/>
-          <a:fontRef idx="minor"/>
-        </p:style>
-        <p:txBody>
-          <a:bodyPr lIns="90000" rIns="90000" tIns="45000" bIns="45000" anchor="ctr"/>
-          <a:p>
-            <a:pPr algn="r">
-              <a:lnSpc>
-                <a:spcPct val="100000"/>
-              </a:lnSpc>
-            </a:pPr>
-            <a:fld id="{AFBA4B6B-5BB2-470F-B3E1-F60DF1CF702F}" type="slidenum">
-              <a:rPr b="0" lang="en-US" sz="1200" spc="-1" strike="noStrike">
-                <a:solidFill>
-                  <a:srgbClr val="888888"/>
-                </a:solidFill>
-                <a:uFill>
-                  <a:solidFill>
-                    <a:srgbClr val="ffffff"/>
-                  </a:solidFill>
-                </a:uFill>
-                <a:latin typeface="Arial"/>
-                <a:ea typeface="Arial"/>
-              </a:rPr>
-              <a:t>1</a:t>
+              <a:t>&lt;number&gt;</a:t>
             </a:fld>
             <a:endParaRPr b="0" lang="en-US" sz="1800" spc="-1" strike="noStrike">
               <a:solidFill>
@@ -9634,13 +9439,17 @@
         </p:nvSpPr>
         <p:spPr>
           <a:xfrm>
-            <a:off x="443160" y="326880"/>
-            <a:ext cx="7315200" cy="855360"/>
-          </a:xfrm>
-          <a:prstGeom prst="rect">
-            <a:avLst/>
-          </a:prstGeom>
-          <a:noFill/>
+            <a:off x="0" y="0"/>
+            <a:ext cx="9141840" cy="5141520"/>
+          </a:xfrm>
+          <a:prstGeom prst="rect">
+            <a:avLst/>
+          </a:prstGeom>
+          <a:solidFill>
+            <a:srgbClr val="5c0d1c">
+              <a:alpha val="85000"/>
+            </a:srgbClr>
+          </a:solidFill>
           <a:ln>
             <a:noFill/>
           </a:ln>
@@ -9651,306 +9460,30 @@
           <a:effectRef idx="0"/>
           <a:fontRef idx="minor"/>
         </p:style>
-        <p:txBody>
-          <a:bodyPr lIns="90000" rIns="90000" tIns="91440" bIns="91440" anchor="b"/>
-          <a:p>
-            <a:pPr>
-              <a:lnSpc>
-                <a:spcPct val="100000"/>
-              </a:lnSpc>
-            </a:pPr>
-            <a:r>
-              <a:rPr b="1" lang="en-US" sz="2800" spc="-1" strike="noStrike">
-                <a:solidFill>
-                  <a:srgbClr val="861119"/>
-                </a:solidFill>
-                <a:uFill>
-                  <a:solidFill>
-                    <a:srgbClr val="ffffff"/>
-                  </a:solidFill>
-                </a:uFill>
-                <a:latin typeface="Arial"/>
-                <a:ea typeface="Arial"/>
-              </a:rPr>
-              <a:t>References:</a:t>
-            </a:r>
-            <a:endParaRPr b="0" lang="en-US" sz="1800" spc="-1" strike="noStrike">
-              <a:solidFill>
-                <a:srgbClr val="000000"/>
-              </a:solidFill>
-              <a:uFill>
-                <a:solidFill>
-                  <a:srgbClr val="ffffff"/>
-                </a:solidFill>
-              </a:uFill>
-              <a:latin typeface="Arial"/>
-            </a:endParaRPr>
-          </a:p>
-        </p:txBody>
-      </p:sp>
-      <p:sp>
-        <p:nvSpPr>
-          <p:cNvPr id="144" name="CustomShape 2"/>
-          <p:cNvSpPr/>
+      </p:sp>
+      <p:pic>
+        <p:nvPicPr>
+          <p:cNvPr id="144" name="Shape 82" descr=""/>
+          <p:cNvPicPr/>
           <p:nvPr/>
-        </p:nvSpPr>
-        <p:spPr>
-          <a:xfrm>
-            <a:off x="386640" y="1303920"/>
-            <a:ext cx="7984080" cy="3286440"/>
-          </a:xfrm>
-          <a:prstGeom prst="rect">
-            <a:avLst/>
-          </a:prstGeom>
-          <a:noFill/>
+        </p:nvPicPr>
+        <p:blipFill>
+          <a:blip r:embed="rId1"/>
+          <a:stretch/>
+        </p:blipFill>
+        <p:spPr>
+          <a:xfrm>
+            <a:off x="3385440" y="2282040"/>
+            <a:ext cx="2109600" cy="420120"/>
+          </a:xfrm>
+          <a:prstGeom prst="rect">
+            <a:avLst/>
+          </a:prstGeom>
           <a:ln>
             <a:noFill/>
           </a:ln>
         </p:spPr>
-        <p:style>
-          <a:lnRef idx="0"/>
-          <a:fillRef idx="0"/>
-          <a:effectRef idx="0"/>
-          <a:fontRef idx="minor"/>
-        </p:style>
-        <p:txBody>
-          <a:bodyPr lIns="90000" rIns="90000" tIns="91440" bIns="91440"/>
-          <a:p>
-            <a:pPr marL="228600" indent="-99720">
-              <a:lnSpc>
-                <a:spcPct val="100000"/>
-              </a:lnSpc>
-              <a:buClr>
-                <a:srgbClr val="990000"/>
-              </a:buClr>
-              <a:buFont typeface="Arial"/>
-              <a:buChar char="•"/>
-            </a:pPr>
-            <a:r>
-              <a:rPr b="0" lang="en-US" sz="1200" spc="-1" strike="noStrike">
-                <a:solidFill>
-                  <a:srgbClr val="000000"/>
-                </a:solidFill>
-                <a:uFill>
-                  <a:solidFill>
-                    <a:srgbClr val="ffffff"/>
-                  </a:solidFill>
-                </a:uFill>
-                <a:latin typeface="Arial"/>
-                <a:ea typeface="Arial"/>
-              </a:rPr>
-              <a:t>“</a:t>
-            </a:r>
-            <a:r>
-              <a:rPr b="0" i="1" lang="en-US" sz="1200" spc="-1" strike="noStrike">
-                <a:solidFill>
-                  <a:srgbClr val="000000"/>
-                </a:solidFill>
-                <a:uFill>
-                  <a:solidFill>
-                    <a:srgbClr val="ffffff"/>
-                  </a:solidFill>
-                </a:uFill>
-                <a:latin typeface="Arial"/>
-                <a:ea typeface="Arial"/>
-              </a:rPr>
-              <a:t>Speech2Health: A Mobile Framework for Monitoring Dietary Composition from Spoken Data</a:t>
-            </a:r>
-            <a:r>
-              <a:rPr b="0" lang="en-US" sz="1200" spc="-1" strike="noStrike">
-                <a:solidFill>
-                  <a:srgbClr val="000000"/>
-                </a:solidFill>
-                <a:uFill>
-                  <a:solidFill>
-                    <a:srgbClr val="ffffff"/>
-                  </a:solidFill>
-                </a:uFill>
-                <a:latin typeface="Arial"/>
-                <a:ea typeface="Arial"/>
-              </a:rPr>
-              <a:t>”. Niloofar Hezarjaribi, Sepideh Mazrouee, Hassan Ghasemzadeh. IEEE JOURNAL OF BIOMEDICAL AND HEALTH INFORMATICS, 2017.</a:t>
-            </a:r>
-            <a:endParaRPr b="0" lang="en-US" sz="1800" spc="-1" strike="noStrike">
-              <a:solidFill>
-                <a:srgbClr val="000000"/>
-              </a:solidFill>
-              <a:uFill>
-                <a:solidFill>
-                  <a:srgbClr val="ffffff"/>
-                </a:solidFill>
-              </a:uFill>
-              <a:latin typeface="Arial"/>
-            </a:endParaRPr>
-          </a:p>
-          <a:p>
-            <a:pPr marL="228600" indent="-99720">
-              <a:lnSpc>
-                <a:spcPct val="100000"/>
-              </a:lnSpc>
-              <a:buClr>
-                <a:srgbClr val="990000"/>
-              </a:buClr>
-              <a:buFont typeface="Arial"/>
-              <a:buChar char="•"/>
-            </a:pPr>
-            <a:r>
-              <a:rPr b="0" lang="en-US" sz="1200" spc="-1" strike="noStrike">
-                <a:solidFill>
-                  <a:srgbClr val="000000"/>
-                </a:solidFill>
-                <a:uFill>
-                  <a:solidFill>
-                    <a:srgbClr val="ffffff"/>
-                  </a:solidFill>
-                </a:uFill>
-                <a:latin typeface="Arial"/>
-                <a:ea typeface="Arial"/>
-              </a:rPr>
-              <a:t>“</a:t>
-            </a:r>
-            <a:r>
-              <a:rPr b="0" i="1" lang="en-US" sz="1200" spc="-1" strike="noStrike">
-                <a:solidFill>
-                  <a:srgbClr val="000000"/>
-                </a:solidFill>
-                <a:uFill>
-                  <a:solidFill>
-                    <a:srgbClr val="ffffff"/>
-                  </a:solidFill>
-                </a:uFill>
-                <a:latin typeface="Arial"/>
-                <a:ea typeface="Arial"/>
-              </a:rPr>
-              <a:t>S2NI: A Mobile Platform for Nutrition Monitoring from Spoken Data</a:t>
-            </a:r>
-            <a:r>
-              <a:rPr b="0" lang="en-US" sz="1200" spc="-1" strike="noStrike">
-                <a:solidFill>
-                  <a:srgbClr val="000000"/>
-                </a:solidFill>
-                <a:uFill>
-                  <a:solidFill>
-                    <a:srgbClr val="ffffff"/>
-                  </a:solidFill>
-                </a:uFill>
-                <a:latin typeface="Arial"/>
-                <a:ea typeface="Arial"/>
-              </a:rPr>
-              <a:t>”. Niloofar Hezarjaribi, Cody A. Reynold, Drew T. Miller, Naomi Chaytor, Hassan Ghasemzadeh. IEEE Engineering in Medicine and Biology Society. 2016</a:t>
-            </a:r>
-            <a:endParaRPr b="0" lang="en-US" sz="1800" spc="-1" strike="noStrike">
-              <a:solidFill>
-                <a:srgbClr val="000000"/>
-              </a:solidFill>
-              <a:uFill>
-                <a:solidFill>
-                  <a:srgbClr val="ffffff"/>
-                </a:solidFill>
-              </a:uFill>
-              <a:latin typeface="Arial"/>
-            </a:endParaRPr>
-          </a:p>
-          <a:p>
-            <a:pPr>
-              <a:lnSpc>
-                <a:spcPct val="100000"/>
-              </a:lnSpc>
-            </a:pPr>
-            <a:endParaRPr b="0" lang="en-US" sz="1800" spc="-1" strike="noStrike">
-              <a:solidFill>
-                <a:srgbClr val="000000"/>
-              </a:solidFill>
-              <a:uFill>
-                <a:solidFill>
-                  <a:srgbClr val="ffffff"/>
-                </a:solidFill>
-              </a:uFill>
-              <a:latin typeface="Arial"/>
-            </a:endParaRPr>
-          </a:p>
-          <a:p>
-            <a:pPr>
-              <a:lnSpc>
-                <a:spcPct val="100000"/>
-              </a:lnSpc>
-            </a:pPr>
-            <a:endParaRPr b="0" lang="en-US" sz="1800" spc="-1" strike="noStrike">
-              <a:solidFill>
-                <a:srgbClr val="000000"/>
-              </a:solidFill>
-              <a:uFill>
-                <a:solidFill>
-                  <a:srgbClr val="ffffff"/>
-                </a:solidFill>
-              </a:uFill>
-              <a:latin typeface="Arial"/>
-            </a:endParaRPr>
-          </a:p>
-        </p:txBody>
-      </p:sp>
-      <p:sp>
-        <p:nvSpPr>
-          <p:cNvPr id="145" name="CustomShape 3"/>
-          <p:cNvSpPr/>
-          <p:nvPr/>
-        </p:nvSpPr>
-        <p:spPr>
-          <a:xfrm>
-            <a:off x="6774120" y="4688280"/>
-            <a:ext cx="2131920" cy="272880"/>
-          </a:xfrm>
-          <a:prstGeom prst="rect">
-            <a:avLst/>
-          </a:prstGeom>
-          <a:noFill/>
-          <a:ln>
-            <a:noFill/>
-          </a:ln>
-        </p:spPr>
-        <p:style>
-          <a:lnRef idx="0"/>
-          <a:fillRef idx="0"/>
-          <a:effectRef idx="0"/>
-          <a:fontRef idx="minor"/>
-        </p:style>
-        <p:txBody>
-          <a:bodyPr lIns="90000" rIns="90000" tIns="45000" bIns="45000" anchor="ctr"/>
-          <a:p>
-            <a:pPr algn="r">
-              <a:lnSpc>
-                <a:spcPct val="100000"/>
-              </a:lnSpc>
-            </a:pPr>
-            <a:fld id="{00DAA441-3265-4865-AEB0-290A1D76459C}" type="slidenum">
-              <a:rPr b="0" lang="en-US" sz="1200" spc="-1" strike="noStrike">
-                <a:solidFill>
-                  <a:srgbClr val="888888"/>
-                </a:solidFill>
-                <a:uFill>
-                  <a:solidFill>
-                    <a:srgbClr val="ffffff"/>
-                  </a:solidFill>
-                </a:uFill>
-                <a:latin typeface="Arial"/>
-                <a:ea typeface="Arial"/>
-              </a:rPr>
-              <a:t>1</a:t>
-            </a:fld>
-            <a:endParaRPr b="0" lang="en-US" sz="1800" spc="-1" strike="noStrike">
-              <a:solidFill>
-                <a:srgbClr val="000000"/>
-              </a:solidFill>
-              <a:uFill>
-                <a:solidFill>
-                  <a:srgbClr val="ffffff"/>
-                </a:solidFill>
-              </a:uFill>
-              <a:latin typeface="Arial"/>
-            </a:endParaRPr>
-          </a:p>
-        </p:txBody>
-      </p:sp>
+      </p:pic>
     </p:spTree>
   </p:cSld>
   <p:transition spd="med">
@@ -9963,111 +9496,6 @@
           <p:childTnLst>
             <p:seq>
               <p:cTn id="16" nodeType="mainSeq"/>
-              <p:prevCondLst>
-                <p:cond delay="0" evt="onPrev">
-                  <p:tgtEl>
-                    <p:sldTgt/>
-                  </p:tgtEl>
-                </p:cond>
-              </p:prevCondLst>
-              <p:nextCondLst>
-                <p:cond delay="0" evt="onNext">
-                  <p:tgtEl>
-                    <p:sldTgt/>
-                  </p:tgtEl>
-                </p:cond>
-              </p:nextCondLst>
-            </p:seq>
-          </p:childTnLst>
-        </p:cTn>
-      </p:par>
-    </p:tnLst>
-  </p:timing>
-</p:sld>
-</file>
-
-<file path=ppt/slides/slide9.xml><?xml version="1.0" encoding="utf-8"?>
-<p:sld xmlns:a="http://schemas.openxmlformats.org/drawingml/2006/main" xmlns:p="http://schemas.openxmlformats.org/presentationml/2006/main" xmlns:r="http://schemas.openxmlformats.org/officeDocument/2006/relationships" xmlns:p14="http://schemas.microsoft.com/office/powerpoint/2010/main" xmlns:p15="http://schemas.microsoft.com/office/powerpoint/2012/main" xmlns:mc="http://schemas.openxmlformats.org/markup-compatibility/2006">
-  <p:cSld>
-    <p:spTree>
-      <p:nvGrpSpPr>
-        <p:cNvPr id="1" name=""/>
-        <p:cNvGrpSpPr/>
-        <p:nvPr/>
-      </p:nvGrpSpPr>
-      <p:grpSpPr>
-        <a:xfrm>
-          <a:off x="0" y="0"/>
-          <a:ext cx="0" cy="0"/>
-          <a:chOff x="0" y="0"/>
-          <a:chExt cx="0" cy="0"/>
-        </a:xfrm>
-      </p:grpSpPr>
-      <p:sp>
-        <p:nvSpPr>
-          <p:cNvPr id="146" name="CustomShape 1"/>
-          <p:cNvSpPr/>
-          <p:nvPr/>
-        </p:nvSpPr>
-        <p:spPr>
-          <a:xfrm>
-            <a:off x="0" y="0"/>
-            <a:ext cx="9142200" cy="5141880"/>
-          </a:xfrm>
-          <a:prstGeom prst="rect">
-            <a:avLst/>
-          </a:prstGeom>
-          <a:solidFill>
-            <a:srgbClr val="5c0d1c">
-              <a:alpha val="85000"/>
-            </a:srgbClr>
-          </a:solidFill>
-          <a:ln>
-            <a:noFill/>
-          </a:ln>
-        </p:spPr>
-        <p:style>
-          <a:lnRef idx="0"/>
-          <a:fillRef idx="0"/>
-          <a:effectRef idx="0"/>
-          <a:fontRef idx="minor"/>
-        </p:style>
-      </p:sp>
-      <p:pic>
-        <p:nvPicPr>
-          <p:cNvPr id="147" name="Shape 82" descr=""/>
-          <p:cNvPicPr/>
-          <p:nvPr/>
-        </p:nvPicPr>
-        <p:blipFill>
-          <a:blip r:embed="rId1"/>
-          <a:stretch/>
-        </p:blipFill>
-        <p:spPr>
-          <a:xfrm>
-            <a:off x="3385440" y="2282040"/>
-            <a:ext cx="2109960" cy="420480"/>
-          </a:xfrm>
-          <a:prstGeom prst="rect">
-            <a:avLst/>
-          </a:prstGeom>
-          <a:ln>
-            <a:noFill/>
-          </a:ln>
-        </p:spPr>
-      </p:pic>
-    </p:spTree>
-  </p:cSld>
-  <p:transition spd="med">
-    <p:fade thruBlk="true"/>
-  </p:transition>
-  <p:timing>
-    <p:tnLst>
-      <p:par>
-        <p:cTn id="17" dur="indefinite" restart="never" nodeType="tmRoot">
-          <p:childTnLst>
-            <p:seq>
-              <p:cTn id="18" nodeType="mainSeq"/>
               <p:prevCondLst>
                 <p:cond delay="0" evt="onPrev">
                   <p:tgtEl>

</xml_diff>